<commit_message>
Four Topic We Need To Focus
Four Topic We Need To Focus
</commit_message>
<xml_diff>
--- a/ppt/1 Express JS.pptx
+++ b/ppt/1 Express JS.pptx
@@ -11,7 +11,8 @@
     <p:sldId id="259" r:id="rId5"/>
     <p:sldId id="263" r:id="rId6"/>
     <p:sldId id="261" r:id="rId7"/>
-    <p:sldId id="262" r:id="rId8"/>
+    <p:sldId id="264" r:id="rId8"/>
+    <p:sldId id="262" r:id="rId9"/>
   </p:sldIdLst>
   <p:sldSz cx="9144000" cy="5143500" type="screen16x9"/>
   <p:notesSz cx="6858000" cy="9144000"/>
@@ -295,7 +296,7 @@
             <a:fld id="{1D8BD707-D9CF-40AE-B4C6-C98DA3205C09}" type="datetimeFigureOut">
               <a:rPr lang="en-US" smtClean="0"/>
               <a:pPr/>
-              <a:t>11/4/2020</a:t>
+              <a:t>11/5/2020</a:t>
             </a:fld>
             <a:endParaRPr lang="en-US"/>
           </a:p>
@@ -462,7 +463,7 @@
             <a:fld id="{1D8BD707-D9CF-40AE-B4C6-C98DA3205C09}" type="datetimeFigureOut">
               <a:rPr lang="en-US" smtClean="0"/>
               <a:pPr/>
-              <a:t>11/4/2020</a:t>
+              <a:t>11/5/2020</a:t>
             </a:fld>
             <a:endParaRPr lang="en-US"/>
           </a:p>
@@ -639,7 +640,7 @@
             <a:fld id="{1D8BD707-D9CF-40AE-B4C6-C98DA3205C09}" type="datetimeFigureOut">
               <a:rPr lang="en-US" smtClean="0"/>
               <a:pPr/>
-              <a:t>11/4/2020</a:t>
+              <a:t>11/5/2020</a:t>
             </a:fld>
             <a:endParaRPr lang="en-US"/>
           </a:p>
@@ -806,7 +807,7 @@
             <a:fld id="{1D8BD707-D9CF-40AE-B4C6-C98DA3205C09}" type="datetimeFigureOut">
               <a:rPr lang="en-US" smtClean="0"/>
               <a:pPr/>
-              <a:t>11/4/2020</a:t>
+              <a:t>11/5/2020</a:t>
             </a:fld>
             <a:endParaRPr lang="en-US"/>
           </a:p>
@@ -1049,7 +1050,7 @@
             <a:fld id="{1D8BD707-D9CF-40AE-B4C6-C98DA3205C09}" type="datetimeFigureOut">
               <a:rPr lang="en-US" smtClean="0"/>
               <a:pPr/>
-              <a:t>11/4/2020</a:t>
+              <a:t>11/5/2020</a:t>
             </a:fld>
             <a:endParaRPr lang="en-US"/>
           </a:p>
@@ -1334,7 +1335,7 @@
             <a:fld id="{1D8BD707-D9CF-40AE-B4C6-C98DA3205C09}" type="datetimeFigureOut">
               <a:rPr lang="en-US" smtClean="0"/>
               <a:pPr/>
-              <a:t>11/4/2020</a:t>
+              <a:t>11/5/2020</a:t>
             </a:fld>
             <a:endParaRPr lang="en-US"/>
           </a:p>
@@ -1753,7 +1754,7 @@
             <a:fld id="{1D8BD707-D9CF-40AE-B4C6-C98DA3205C09}" type="datetimeFigureOut">
               <a:rPr lang="en-US" smtClean="0"/>
               <a:pPr/>
-              <a:t>11/4/2020</a:t>
+              <a:t>11/5/2020</a:t>
             </a:fld>
             <a:endParaRPr lang="en-US"/>
           </a:p>
@@ -1868,7 +1869,7 @@
             <a:fld id="{1D8BD707-D9CF-40AE-B4C6-C98DA3205C09}" type="datetimeFigureOut">
               <a:rPr lang="en-US" smtClean="0"/>
               <a:pPr/>
-              <a:t>11/4/2020</a:t>
+              <a:t>11/5/2020</a:t>
             </a:fld>
             <a:endParaRPr lang="en-US"/>
           </a:p>
@@ -1960,7 +1961,7 @@
             <a:fld id="{1D8BD707-D9CF-40AE-B4C6-C98DA3205C09}" type="datetimeFigureOut">
               <a:rPr lang="en-US" smtClean="0"/>
               <a:pPr/>
-              <a:t>11/4/2020</a:t>
+              <a:t>11/5/2020</a:t>
             </a:fld>
             <a:endParaRPr lang="en-US"/>
           </a:p>
@@ -2234,7 +2235,7 @@
             <a:fld id="{1D8BD707-D9CF-40AE-B4C6-C98DA3205C09}" type="datetimeFigureOut">
               <a:rPr lang="en-US" smtClean="0"/>
               <a:pPr/>
-              <a:t>11/4/2020</a:t>
+              <a:t>11/5/2020</a:t>
             </a:fld>
             <a:endParaRPr lang="en-US"/>
           </a:p>
@@ -2484,7 +2485,7 @@
             <a:fld id="{1D8BD707-D9CF-40AE-B4C6-C98DA3205C09}" type="datetimeFigureOut">
               <a:rPr lang="en-US" smtClean="0"/>
               <a:pPr/>
-              <a:t>11/4/2020</a:t>
+              <a:t>11/5/2020</a:t>
             </a:fld>
             <a:endParaRPr lang="en-US"/>
           </a:p>
@@ -2703,7 +2704,7 @@
             <a:fld id="{1D8BD707-D9CF-40AE-B4C6-C98DA3205C09}" type="datetimeFigureOut">
               <a:rPr lang="en-US" smtClean="0"/>
               <a:pPr/>
-              <a:t>11/4/2020</a:t>
+              <a:t>11/5/2020</a:t>
             </a:fld>
             <a:endParaRPr lang="en-US"/>
           </a:p>
@@ -5033,7 +5034,6 @@
               <a:rPr lang="en-US" sz="3200" dirty="0" smtClean="0"/>
               <a:t>Express JS</a:t>
             </a:r>
-            <a:endParaRPr lang="en-US" sz="3200" dirty="0" smtClean="0"/>
           </a:p>
           <a:p>
             <a:pPr algn="ctr"/>
@@ -5091,7 +5091,7 @@
         <p:spPr>
           <a:xfrm>
             <a:off x="365062" y="840422"/>
-            <a:ext cx="6188138" cy="646331"/>
+            <a:ext cx="6188138" cy="1200329"/>
           </a:xfrm>
           <a:prstGeom prst="rect">
             <a:avLst/>
@@ -5109,6 +5109,15 @@
           </a:bodyPr>
           <a:lstStyle/>
           <a:p>
+            <a:endParaRPr lang="bn-IN" b="1" dirty="0" smtClean="0">
+              <a:solidFill>
+                <a:schemeClr val="bg1"/>
+              </a:solidFill>
+              <a:latin typeface="Roboto Condensed" pitchFamily="2" charset="0"/>
+              <a:ea typeface="Roboto Condensed" pitchFamily="2" charset="0"/>
+            </a:endParaRPr>
+          </a:p>
+          <a:p>
             <a:r>
               <a:rPr lang="bn-IN" b="1" dirty="0" smtClean="0">
                 <a:solidFill>
@@ -5117,7 +5126,17 @@
                 <a:latin typeface="Roboto Condensed" pitchFamily="2" charset="0"/>
                 <a:ea typeface="Roboto Condensed" pitchFamily="2" charset="0"/>
               </a:rPr>
-              <a:t>সার্ভার সাইডে দক্ষতার জন্য-</a:t>
+              <a:t>সার্ভার </a:t>
+            </a:r>
+            <a:r>
+              <a:rPr lang="bn-IN" b="1" dirty="0" smtClean="0">
+                <a:solidFill>
+                  <a:schemeClr val="bg1"/>
+                </a:solidFill>
+                <a:latin typeface="Roboto Condensed" pitchFamily="2" charset="0"/>
+                <a:ea typeface="Roboto Condensed" pitchFamily="2" charset="0"/>
+              </a:rPr>
+              <a:t>সাইডে দক্ষতার জন্য-</a:t>
             </a:r>
           </a:p>
           <a:p>
@@ -5139,17 +5158,7 @@
                 <a:latin typeface="Roboto Condensed" pitchFamily="2" charset="0"/>
                 <a:ea typeface="Roboto Condensed" pitchFamily="2" charset="0"/>
               </a:rPr>
-              <a:t>চারটি  বিষয় ভালো করে বুঝ</a:t>
-            </a:r>
-            <a:r>
-              <a:rPr lang="en-US" b="1" dirty="0">
-                <a:solidFill>
-                  <a:schemeClr val="bg1"/>
-                </a:solidFill>
-                <a:latin typeface="Roboto Condensed" pitchFamily="2" charset="0"/>
-                <a:ea typeface="Roboto Condensed" pitchFamily="2" charset="0"/>
-              </a:rPr>
-              <a:t> </a:t>
+              <a:t>চারটি  বিষয় ভালো করে </a:t>
             </a:r>
             <a:r>
               <a:rPr lang="bn-IN" b="1" dirty="0" smtClean="0">
@@ -5159,7 +5168,17 @@
                 <a:latin typeface="Roboto Condensed" pitchFamily="2" charset="0"/>
                 <a:ea typeface="Roboto Condensed" pitchFamily="2" charset="0"/>
               </a:rPr>
-              <a:t>হবে  শিখতে হবে </a:t>
+              <a:t>বুঝ</a:t>
+            </a:r>
+            <a:r>
+              <a:rPr lang="bn-IN" b="1" dirty="0" smtClean="0">
+                <a:solidFill>
+                  <a:schemeClr val="bg1"/>
+                </a:solidFill>
+                <a:latin typeface="Roboto Condensed" pitchFamily="2" charset="0"/>
+                <a:ea typeface="Roboto Condensed" pitchFamily="2" charset="0"/>
+              </a:rPr>
+              <a:t>তে </a:t>
             </a:r>
             <a:r>
               <a:rPr lang="en-US" b="1" dirty="0" smtClean="0">
@@ -5171,6 +5190,48 @@
               </a:rPr>
               <a:t> </a:t>
             </a:r>
+            <a:r>
+              <a:rPr lang="bn-IN" b="1" dirty="0" smtClean="0">
+                <a:solidFill>
+                  <a:schemeClr val="bg1"/>
+                </a:solidFill>
+                <a:latin typeface="Roboto Condensed" pitchFamily="2" charset="0"/>
+                <a:ea typeface="Roboto Condensed" pitchFamily="2" charset="0"/>
+              </a:rPr>
+              <a:t>হবে  শিখতে </a:t>
+            </a:r>
+            <a:r>
+              <a:rPr lang="bn-IN" b="1" dirty="0" smtClean="0">
+                <a:solidFill>
+                  <a:schemeClr val="bg1"/>
+                </a:solidFill>
+                <a:latin typeface="Roboto Condensed" pitchFamily="2" charset="0"/>
+                <a:ea typeface="Roboto Condensed" pitchFamily="2" charset="0"/>
+              </a:rPr>
+              <a:t>হবে</a:t>
+            </a:r>
+          </a:p>
+          <a:p>
+            <a:r>
+              <a:rPr lang="bn-IN" b="1" dirty="0" smtClean="0">
+                <a:solidFill>
+                  <a:schemeClr val="bg1"/>
+                </a:solidFill>
+                <a:latin typeface="Roboto Condensed" pitchFamily="2" charset="0"/>
+                <a:ea typeface="Roboto Condensed" pitchFamily="2" charset="0"/>
+              </a:rPr>
+              <a:t> </a:t>
+            </a:r>
+            <a:r>
+              <a:rPr lang="en-US" b="1" dirty="0" smtClean="0">
+                <a:solidFill>
+                  <a:schemeClr val="bg1"/>
+                </a:solidFill>
+                <a:latin typeface="Roboto Condensed" pitchFamily="2" charset="0"/>
+                <a:ea typeface="Roboto Condensed" pitchFamily="2" charset="0"/>
+              </a:rPr>
+              <a:t> </a:t>
+            </a:r>
             <a:endParaRPr lang="en-US" b="1" dirty="0">
               <a:solidFill>
                 <a:schemeClr val="bg1"/>
@@ -5189,7 +5250,7 @@
         </p:nvSpPr>
         <p:spPr>
           <a:xfrm>
-            <a:off x="371412" y="1733550"/>
+            <a:off x="304800" y="2190750"/>
             <a:ext cx="2380780" cy="1200329"/>
           </a:xfrm>
           <a:prstGeom prst="rect">
@@ -5277,9 +5338,188 @@
   <p:timing>
     <p:tnLst>
       <p:par>
-        <p:cTn id="1" dur="indefinite" restart="never" nodeType="tmRoot"/>
+        <p:cTn id="1" dur="indefinite" restart="never" nodeType="tmRoot">
+          <p:childTnLst>
+            <p:seq concurrent="1" nextAc="seek">
+              <p:cTn id="2" dur="indefinite" nodeType="mainSeq">
+                <p:childTnLst>
+                  <p:par>
+                    <p:cTn id="3" fill="hold">
+                      <p:stCondLst>
+                        <p:cond delay="indefinite"/>
+                      </p:stCondLst>
+                      <p:childTnLst>
+                        <p:par>
+                          <p:cTn id="4" fill="hold">
+                            <p:stCondLst>
+                              <p:cond delay="0"/>
+                            </p:stCondLst>
+                            <p:childTnLst>
+                              <p:par>
+                                <p:cTn id="5" presetID="10" presetClass="entr" presetSubtype="0" fill="hold" grpId="0" nodeType="clickEffect">
+                                  <p:stCondLst>
+                                    <p:cond delay="0"/>
+                                  </p:stCondLst>
+                                  <p:childTnLst>
+                                    <p:set>
+                                      <p:cBhvr>
+                                        <p:cTn id="6" dur="1" fill="hold">
+                                          <p:stCondLst>
+                                            <p:cond delay="0"/>
+                                          </p:stCondLst>
+                                        </p:cTn>
+                                        <p:tgtEl>
+                                          <p:spTgt spid="4"/>
+                                        </p:tgtEl>
+                                        <p:attrNameLst>
+                                          <p:attrName>style.visibility</p:attrName>
+                                        </p:attrNameLst>
+                                      </p:cBhvr>
+                                      <p:to>
+                                        <p:strVal val="visible"/>
+                                      </p:to>
+                                    </p:set>
+                                    <p:animEffect transition="in" filter="fade">
+                                      <p:cBhvr>
+                                        <p:cTn id="7" dur="500"/>
+                                        <p:tgtEl>
+                                          <p:spTgt spid="4"/>
+                                        </p:tgtEl>
+                                      </p:cBhvr>
+                                    </p:animEffect>
+                                  </p:childTnLst>
+                                </p:cTn>
+                              </p:par>
+                            </p:childTnLst>
+                          </p:cTn>
+                        </p:par>
+                      </p:childTnLst>
+                    </p:cTn>
+                  </p:par>
+                  <p:par>
+                    <p:cTn id="8" fill="hold">
+                      <p:stCondLst>
+                        <p:cond delay="indefinite"/>
+                      </p:stCondLst>
+                      <p:childTnLst>
+                        <p:par>
+                          <p:cTn id="9" fill="hold">
+                            <p:stCondLst>
+                              <p:cond delay="0"/>
+                            </p:stCondLst>
+                            <p:childTnLst>
+                              <p:par>
+                                <p:cTn id="10" presetID="42" presetClass="entr" presetSubtype="0" fill="hold" grpId="0" nodeType="clickEffect">
+                                  <p:stCondLst>
+                                    <p:cond delay="0"/>
+                                  </p:stCondLst>
+                                  <p:childTnLst>
+                                    <p:set>
+                                      <p:cBhvr>
+                                        <p:cTn id="11" dur="1" fill="hold">
+                                          <p:stCondLst>
+                                            <p:cond delay="0"/>
+                                          </p:stCondLst>
+                                        </p:cTn>
+                                        <p:tgtEl>
+                                          <p:spTgt spid="28"/>
+                                        </p:tgtEl>
+                                        <p:attrNameLst>
+                                          <p:attrName>style.visibility</p:attrName>
+                                        </p:attrNameLst>
+                                      </p:cBhvr>
+                                      <p:to>
+                                        <p:strVal val="visible"/>
+                                      </p:to>
+                                    </p:set>
+                                    <p:animEffect transition="in" filter="fade">
+                                      <p:cBhvr>
+                                        <p:cTn id="12" dur="1000"/>
+                                        <p:tgtEl>
+                                          <p:spTgt spid="28"/>
+                                        </p:tgtEl>
+                                      </p:cBhvr>
+                                    </p:animEffect>
+                                    <p:anim calcmode="lin" valueType="num">
+                                      <p:cBhvr>
+                                        <p:cTn id="13" dur="1000" fill="hold"/>
+                                        <p:tgtEl>
+                                          <p:spTgt spid="28"/>
+                                        </p:tgtEl>
+                                        <p:attrNameLst>
+                                          <p:attrName>ppt_x</p:attrName>
+                                        </p:attrNameLst>
+                                      </p:cBhvr>
+                                      <p:tavLst>
+                                        <p:tav tm="0">
+                                          <p:val>
+                                            <p:strVal val="#ppt_x"/>
+                                          </p:val>
+                                        </p:tav>
+                                        <p:tav tm="100000">
+                                          <p:val>
+                                            <p:strVal val="#ppt_x"/>
+                                          </p:val>
+                                        </p:tav>
+                                      </p:tavLst>
+                                    </p:anim>
+                                    <p:anim calcmode="lin" valueType="num">
+                                      <p:cBhvr>
+                                        <p:cTn id="14" dur="1000" fill="hold"/>
+                                        <p:tgtEl>
+                                          <p:spTgt spid="28"/>
+                                        </p:tgtEl>
+                                        <p:attrNameLst>
+                                          <p:attrName>ppt_y</p:attrName>
+                                        </p:attrNameLst>
+                                      </p:cBhvr>
+                                      <p:tavLst>
+                                        <p:tav tm="0">
+                                          <p:val>
+                                            <p:strVal val="#ppt_y+.1"/>
+                                          </p:val>
+                                        </p:tav>
+                                        <p:tav tm="100000">
+                                          <p:val>
+                                            <p:strVal val="#ppt_y"/>
+                                          </p:val>
+                                        </p:tav>
+                                      </p:tavLst>
+                                    </p:anim>
+                                  </p:childTnLst>
+                                </p:cTn>
+                              </p:par>
+                            </p:childTnLst>
+                          </p:cTn>
+                        </p:par>
+                      </p:childTnLst>
+                    </p:cTn>
+                  </p:par>
+                </p:childTnLst>
+              </p:cTn>
+              <p:prevCondLst>
+                <p:cond evt="onPrev" delay="0">
+                  <p:tgtEl>
+                    <p:sldTgt/>
+                  </p:tgtEl>
+                </p:cond>
+              </p:prevCondLst>
+              <p:nextCondLst>
+                <p:cond evt="onNext" delay="0">
+                  <p:tgtEl>
+                    <p:sldTgt/>
+                  </p:tgtEl>
+                </p:cond>
+              </p:nextCondLst>
+            </p:seq>
+          </p:childTnLst>
+        </p:cTn>
       </p:par>
     </p:tnLst>
+    <p:bldLst>
+      <p:bldP spid="4" grpId="0" animBg="1"/>
+      <p:bldP spid="28" grpId="0"/>
+    </p:bldLst>
   </p:timing>
 </p:sld>
 </file>
@@ -5309,8 +5549,8 @@
         </p:nvSpPr>
         <p:spPr>
           <a:xfrm>
-            <a:off x="365062" y="840422"/>
-            <a:ext cx="6188138" cy="369332"/>
+            <a:off x="533400" y="742950"/>
+            <a:ext cx="6797738" cy="1754326"/>
           </a:xfrm>
           <a:prstGeom prst="rect">
             <a:avLst/>
@@ -5328,6 +5568,17 @@
           </a:bodyPr>
           <a:lstStyle/>
           <a:p>
+            <a:pPr lvl="1"/>
+            <a:endParaRPr lang="en-US" b="1" dirty="0" smtClean="0">
+              <a:solidFill>
+                <a:schemeClr val="bg1"/>
+              </a:solidFill>
+              <a:latin typeface="Roboto Condensed" pitchFamily="2" charset="0"/>
+              <a:ea typeface="Roboto Condensed" pitchFamily="2" charset="0"/>
+            </a:endParaRPr>
+          </a:p>
+          <a:p>
+            <a:pPr lvl="1"/>
             <a:r>
               <a:rPr lang="en-US" b="1" dirty="0" smtClean="0">
                 <a:solidFill>
@@ -5338,7 +5589,55 @@
               </a:rPr>
               <a:t>Response </a:t>
             </a:r>
-            <a:endParaRPr lang="en-US" b="1" dirty="0">
+          </a:p>
+          <a:p>
+            <a:pPr marL="800100" lvl="1" indent="-342900">
+              <a:buAutoNum type="arabicPeriod"/>
+            </a:pPr>
+            <a:r>
+              <a:rPr lang="en-US" dirty="0" smtClean="0">
+                <a:solidFill>
+                  <a:schemeClr val="bg1"/>
+                </a:solidFill>
+                <a:latin typeface="Roboto Condensed" pitchFamily="2" charset="0"/>
+                <a:ea typeface="Roboto Condensed" pitchFamily="2" charset="0"/>
+              </a:rPr>
+              <a:t>Response Body</a:t>
+            </a:r>
+          </a:p>
+          <a:p>
+            <a:pPr marL="800100" lvl="1" indent="-342900">
+              <a:buAutoNum type="arabicPeriod"/>
+            </a:pPr>
+            <a:r>
+              <a:rPr lang="en-US" dirty="0" smtClean="0">
+                <a:solidFill>
+                  <a:schemeClr val="bg1"/>
+                </a:solidFill>
+                <a:latin typeface="Roboto Condensed" pitchFamily="2" charset="0"/>
+                <a:ea typeface="Roboto Condensed" pitchFamily="2" charset="0"/>
+              </a:rPr>
+              <a:t>Response Header</a:t>
+            </a:r>
+          </a:p>
+          <a:p>
+            <a:pPr marL="800100" lvl="1" indent="-342900">
+              <a:buAutoNum type="arabicPeriod"/>
+            </a:pPr>
+            <a:r>
+              <a:rPr lang="en-US" dirty="0" smtClean="0">
+                <a:solidFill>
+                  <a:schemeClr val="bg1"/>
+                </a:solidFill>
+                <a:latin typeface="Roboto Condensed" pitchFamily="2" charset="0"/>
+                <a:ea typeface="Roboto Condensed" pitchFamily="2" charset="0"/>
+              </a:rPr>
+              <a:t>Response Status</a:t>
+            </a:r>
+          </a:p>
+          <a:p>
+            <a:pPr lvl="1"/>
+            <a:endParaRPr lang="en-US" dirty="0">
               <a:solidFill>
                 <a:schemeClr val="bg1"/>
               </a:solidFill>
@@ -5348,6 +5647,43 @@
           </a:p>
         </p:txBody>
       </p:sp>
+    </p:spTree>
+    <p:extLst>
+      <p:ext uri="{BB962C8B-B14F-4D97-AF65-F5344CB8AC3E}">
+        <p14:creationId xmlns:p14="http://schemas.microsoft.com/office/powerpoint/2010/main" val="238866872"/>
+      </p:ext>
+    </p:extLst>
+  </p:cSld>
+  <p:clrMapOvr>
+    <a:masterClrMapping/>
+  </p:clrMapOvr>
+  <p:timing>
+    <p:tnLst>
+      <p:par>
+        <p:cTn id="1" dur="indefinite" restart="never" nodeType="tmRoot"/>
+      </p:par>
+    </p:tnLst>
+  </p:timing>
+</p:sld>
+</file>
+
+<file path=ppt/slides/slide8.xml><?xml version="1.0" encoding="utf-8"?>
+<p:sld xmlns:a="http://schemas.openxmlformats.org/drawingml/2006/main" xmlns:r="http://schemas.openxmlformats.org/officeDocument/2006/relationships" xmlns:p="http://schemas.openxmlformats.org/presentationml/2006/main">
+  <p:cSld>
+    <p:spTree>
+      <p:nvGrpSpPr>
+        <p:cNvPr id="1" name=""/>
+        <p:cNvGrpSpPr/>
+        <p:nvPr/>
+      </p:nvGrpSpPr>
+      <p:grpSpPr>
+        <a:xfrm>
+          <a:off x="0" y="0"/>
+          <a:ext cx="0" cy="0"/>
+          <a:chOff x="0" y="0"/>
+          <a:chExt cx="0" cy="0"/>
+        </a:xfrm>
+      </p:grpSpPr>
       <p:sp>
         <p:nvSpPr>
           <p:cNvPr id="28" name="TextBox 27"/>
@@ -5356,7 +5692,7 @@
         </p:nvSpPr>
         <p:spPr>
           <a:xfrm>
-            <a:off x="371412" y="1504950"/>
+            <a:off x="304800" y="955238"/>
             <a:ext cx="5234125" cy="2585323"/>
           </a:xfrm>
           <a:prstGeom prst="rect">

</xml_diff>